<commit_message>
Proyecto finalizado para entrega
</commit_message>
<xml_diff>
--- a/presentation.pptx
+++ b/presentation.pptx
@@ -109,6 +109,11 @@
       </a:defRPr>
     </a:lvl9pPr>
   </p:defaultTextStyle>
+  <p:extLst>
+    <p:ext uri="{EFAFB233-063F-42B5-8137-9DF3F51BA10A}">
+      <p15:sldGuideLst xmlns:p15="http://schemas.microsoft.com/office/powerpoint/2012/main"/>
+    </p:ext>
+  </p:extLst>
 </p:presentation>
 </file>
 
@@ -2960,9 +2965,9 @@
     <p:bg>
       <p:bgPr>
         <a:solidFill>
-          <a:srgbClr val="00B0F0">
+          <a:schemeClr val="bg1">
             <a:alpha val="70000"/>
-          </a:srgbClr>
+          </a:schemeClr>
         </a:solidFill>
         <a:effectLst/>
       </p:bgPr>
@@ -3056,93 +3061,45 @@
           </a:p>
         </p:txBody>
       </p:sp>
-      <p:sp>
-        <p:nvSpPr>
-          <p:cNvPr id="25" name="Flecha: a la derecha 24">
+      <p:pic>
+        <p:nvPicPr>
+          <p:cNvPr id="28" name="Gráfico 27">
             <a:extLst>
               <a:ext uri="{FF2B5EF4-FFF2-40B4-BE49-F238E27FC236}">
-                <a16:creationId xmlns:a16="http://schemas.microsoft.com/office/drawing/2014/main" id="{21285495-993F-4451-881A-DF693D3B272A}"/>
+                <a16:creationId xmlns:a16="http://schemas.microsoft.com/office/drawing/2014/main" id="{4F6AF78B-ABA5-4A6E-AF22-01705DE4FC44}"/>
               </a:ext>
             </a:extLst>
           </p:cNvPr>
-          <p:cNvSpPr/>
+          <p:cNvPicPr>
+            <a:picLocks noChangeAspect="1"/>
+          </p:cNvPicPr>
           <p:nvPr/>
-        </p:nvSpPr>
+        </p:nvPicPr>
+        <p:blipFill>
+          <a:blip r:embed="rId4">
+            <a:extLst>
+              <a:ext uri="{28A0092B-C50C-407E-A947-70E740481C1C}">
+                <a14:useLocalDpi xmlns:a14="http://schemas.microsoft.com/office/drawing/2010/main" val="0"/>
+              </a:ext>
+              <a:ext uri="{96DAC541-7B7A-43D3-8B79-37D633B846F1}">
+                <asvg:svgBlip xmlns:asvg="http://schemas.microsoft.com/office/drawing/2016/SVG/main" r:embed="rId5"/>
+              </a:ext>
+            </a:extLst>
+          </a:blip>
+          <a:stretch>
+            <a:fillRect/>
+          </a:stretch>
+        </p:blipFill>
         <p:spPr>
           <a:xfrm>
-            <a:off x="2916195" y="10379676"/>
-            <a:ext cx="2837716" cy="1556951"/>
-          </a:xfrm>
-          <a:prstGeom prst="rightArrow">
-            <a:avLst/>
-          </a:prstGeom>
-          <a:solidFill>
-            <a:schemeClr val="accent1">
-              <a:alpha val="33000"/>
-            </a:schemeClr>
-          </a:solidFill>
-        </p:spPr>
-        <p:style>
-          <a:lnRef idx="2">
-            <a:schemeClr val="accent1">
-              <a:shade val="50000"/>
-            </a:schemeClr>
-          </a:lnRef>
-          <a:fillRef idx="1">
-            <a:schemeClr val="accent1"/>
-          </a:fillRef>
-          <a:effectRef idx="0">
-            <a:schemeClr val="accent1"/>
-          </a:effectRef>
-          <a:fontRef idx="minor">
-            <a:schemeClr val="lt1"/>
-          </a:fontRef>
-        </p:style>
-        <p:txBody>
-          <a:bodyPr rtlCol="0" anchor="ctr"/>
-          <a:lstStyle/>
-          <a:p>
-            <a:pPr algn="ctr"/>
-            <a:endParaRPr lang="es-EC"/>
-          </a:p>
-        </p:txBody>
-      </p:sp>
-      <p:sp>
-        <p:nvSpPr>
-          <p:cNvPr id="26" name="CuadroTexto 25">
-            <a:extLst>
-              <a:ext uri="{FF2B5EF4-FFF2-40B4-BE49-F238E27FC236}">
-                <a16:creationId xmlns:a16="http://schemas.microsoft.com/office/drawing/2014/main" id="{FB9159DC-D5EC-4363-9058-0D7BD3FB0274}"/>
-              </a:ext>
-            </a:extLst>
-          </p:cNvPr>
-          <p:cNvSpPr txBox="1"/>
-          <p:nvPr/>
-        </p:nvSpPr>
-        <p:spPr>
-          <a:xfrm>
-            <a:off x="3113903" y="10851746"/>
-            <a:ext cx="1878227" cy="677108"/>
+            <a:off x="4786397" y="9852668"/>
+            <a:ext cx="2158100" cy="2158100"/>
           </a:xfrm>
           <a:prstGeom prst="rect">
             <a:avLst/>
           </a:prstGeom>
-          <a:noFill/>
         </p:spPr>
-        <p:txBody>
-          <a:bodyPr wrap="square" rtlCol="0">
-            <a:spAutoFit/>
-          </a:bodyPr>
-          <a:lstStyle/>
-          <a:p>
-            <a:r>
-              <a:rPr lang="en-US" sz="3800" dirty="0"/>
-              <a:t>SWIPE</a:t>
-            </a:r>
-            <a:endParaRPr lang="es-EC" sz="3800" dirty="0"/>
-          </a:p>
-        </p:txBody>
-      </p:sp>
+      </p:pic>
     </p:spTree>
     <p:extLst>
       <p:ext uri="{BB962C8B-B14F-4D97-AF65-F5344CB8AC3E}">
@@ -3162,9 +3119,9 @@
     <p:bg>
       <p:bgPr>
         <a:solidFill>
-          <a:srgbClr val="00B0F0">
+          <a:schemeClr val="bg1">
             <a:alpha val="70000"/>
-          </a:srgbClr>
+          </a:schemeClr>
         </a:solidFill>
         <a:effectLst/>
       </p:bgPr>
@@ -3207,25 +3164,29 @@
           <a:lstStyle/>
           <a:p>
             <a:r>
-              <a:rPr lang="en-US" sz="4500" dirty="0">
-                <a:latin typeface="Amasis MT Pro Black" panose="020B0604020202020204" pitchFamily="18" charset="0"/>
+              <a:rPr lang="en-US" sz="4500" b="1" dirty="0">
+                <a:latin typeface="Abadi" panose="020B0604020104020204" pitchFamily="34" charset="0"/>
+                <a:cs typeface="Aharoni" panose="02010803020104030203" pitchFamily="2" charset="-79"/>
               </a:rPr>
               <a:t>Be part of the </a:t>
             </a:r>
             <a:r>
-              <a:rPr lang="en-US" sz="4500" dirty="0" err="1">
-                <a:latin typeface="Amasis MT Pro Black" panose="020B0604020202020204" pitchFamily="18" charset="0"/>
+              <a:rPr lang="en-US" sz="4500" b="1" dirty="0" err="1">
+                <a:latin typeface="Abadi" panose="020B0604020104020204" pitchFamily="34" charset="0"/>
+                <a:cs typeface="Aharoni" panose="02010803020104030203" pitchFamily="2" charset="-79"/>
               </a:rPr>
               <a:t>responsable</a:t>
             </a:r>
             <a:r>
-              <a:rPr lang="en-US" sz="4500" dirty="0">
-                <a:latin typeface="Amasis MT Pro Black" panose="020B0604020202020204" pitchFamily="18" charset="0"/>
+              <a:rPr lang="en-US" sz="4500" b="1" dirty="0">
+                <a:latin typeface="Abadi" panose="020B0604020104020204" pitchFamily="34" charset="0"/>
+                <a:cs typeface="Aharoni" panose="02010803020104030203" pitchFamily="2" charset="-79"/>
               </a:rPr>
               <a:t> way to purchase and consume products</a:t>
             </a:r>
-            <a:endParaRPr lang="es-EC" sz="4500" dirty="0">
-              <a:latin typeface="Amasis MT Pro Black" panose="020B0604020202020204" pitchFamily="18" charset="0"/>
+            <a:endParaRPr lang="es-EC" sz="4500" b="1" dirty="0">
+              <a:latin typeface="Abadi" panose="020B0604020104020204" pitchFamily="34" charset="0"/>
+              <a:cs typeface="Aharoni" panose="02010803020104030203" pitchFamily="2" charset="-79"/>
             </a:endParaRPr>
           </a:p>
         </p:txBody>
@@ -3244,7 +3205,7 @@
         </p:nvSpPr>
         <p:spPr>
           <a:xfrm>
-            <a:off x="3887393" y="5241895"/>
+            <a:off x="4003132" y="4772975"/>
             <a:ext cx="1405505" cy="1164138"/>
           </a:xfrm>
           <a:custGeom>
@@ -3316,7 +3277,7 @@
         </p:nvSpPr>
         <p:spPr>
           <a:xfrm>
-            <a:off x="1844298" y="6391386"/>
+            <a:off x="1960037" y="5922466"/>
             <a:ext cx="1707227" cy="644881"/>
           </a:xfrm>
           <a:custGeom>
@@ -3388,7 +3349,7 @@
         </p:nvSpPr>
         <p:spPr>
           <a:xfrm>
-            <a:off x="2491878" y="3751036"/>
+            <a:off x="2607617" y="3282116"/>
             <a:ext cx="895468" cy="1800157"/>
           </a:xfrm>
           <a:custGeom>
@@ -3460,7 +3421,7 @@
         </p:nvSpPr>
         <p:spPr>
           <a:xfrm>
-            <a:off x="3887393" y="5241775"/>
+            <a:off x="4003132" y="4772855"/>
             <a:ext cx="821160" cy="1114560"/>
           </a:xfrm>
           <a:custGeom>
@@ -3538,7 +3499,7 @@
         </p:nvSpPr>
         <p:spPr>
           <a:xfrm>
-            <a:off x="2268234" y="6391326"/>
+            <a:off x="2383973" y="5922406"/>
             <a:ext cx="1283295" cy="547520"/>
           </a:xfrm>
           <a:custGeom>
@@ -3611,7 +3572,7 @@
         </p:nvSpPr>
         <p:spPr>
           <a:xfrm>
-            <a:off x="2513614" y="4381199"/>
+            <a:off x="2629353" y="3912279"/>
             <a:ext cx="873673" cy="1169946"/>
           </a:xfrm>
           <a:custGeom>
@@ -3684,7 +3645,7 @@
         </p:nvSpPr>
         <p:spPr>
           <a:xfrm>
-            <a:off x="2212248" y="4475209"/>
+            <a:off x="2327987" y="4006289"/>
             <a:ext cx="2351270" cy="2351210"/>
           </a:xfrm>
           <a:custGeom>
@@ -3782,7 +3743,7 @@
         </p:nvSpPr>
         <p:spPr>
           <a:xfrm>
-            <a:off x="2501518" y="4478023"/>
+            <a:off x="2617257" y="4009103"/>
             <a:ext cx="2062001" cy="2348515"/>
           </a:xfrm>
           <a:custGeom>
@@ -3873,7 +3834,7 @@
         </p:nvSpPr>
         <p:spPr>
           <a:xfrm>
-            <a:off x="3050599" y="6295760"/>
+            <a:off x="3166338" y="5826840"/>
             <a:ext cx="294717" cy="173166"/>
           </a:xfrm>
           <a:custGeom>
@@ -4047,7 +4008,7 @@
         </p:nvSpPr>
         <p:spPr>
           <a:xfrm>
-            <a:off x="2199254" y="4579098"/>
+            <a:off x="2314993" y="4110178"/>
             <a:ext cx="1097016" cy="1368141"/>
           </a:xfrm>
           <a:custGeom>
@@ -4559,7 +4520,7 @@
         </p:nvSpPr>
         <p:spPr>
           <a:xfrm>
-            <a:off x="2783064" y="6470186"/>
+            <a:off x="2898803" y="6001266"/>
             <a:ext cx="540754" cy="311962"/>
           </a:xfrm>
           <a:custGeom>
@@ -4792,7 +4753,7 @@
         </p:nvSpPr>
         <p:spPr>
           <a:xfrm>
-            <a:off x="2576425" y="6065347"/>
+            <a:off x="2692164" y="5596427"/>
             <a:ext cx="135982" cy="194602"/>
           </a:xfrm>
           <a:custGeom>
@@ -4923,7 +4884,7 @@
         </p:nvSpPr>
         <p:spPr>
           <a:xfrm>
-            <a:off x="2387091" y="5996666"/>
+            <a:off x="2502830" y="5527746"/>
             <a:ext cx="172806" cy="273700"/>
           </a:xfrm>
           <a:custGeom>
@@ -5011,7 +4972,7 @@
         </p:nvSpPr>
         <p:spPr>
           <a:xfrm>
-            <a:off x="2958267" y="6257258"/>
+            <a:off x="3074006" y="5788338"/>
             <a:ext cx="111731" cy="87960"/>
           </a:xfrm>
           <a:custGeom>
@@ -5124,7 +5085,7 @@
         </p:nvSpPr>
         <p:spPr>
           <a:xfrm>
-            <a:off x="3932661" y="5847987"/>
+            <a:off x="4048400" y="5379067"/>
             <a:ext cx="592548" cy="844273"/>
           </a:xfrm>
           <a:custGeom>
@@ -5339,7 +5300,7 @@
         </p:nvSpPr>
         <p:spPr>
           <a:xfrm>
-            <a:off x="3343342" y="4690592"/>
+            <a:off x="3459081" y="4221672"/>
             <a:ext cx="950974" cy="1286169"/>
           </a:xfrm>
           <a:custGeom>
@@ -6265,7 +6226,7 @@
         </p:nvSpPr>
         <p:spPr>
           <a:xfrm>
-            <a:off x="3678479" y="4525567"/>
+            <a:off x="3794218" y="4056647"/>
             <a:ext cx="400161" cy="193644"/>
           </a:xfrm>
           <a:custGeom>
@@ -6429,7 +6390,7 @@
         </p:nvSpPr>
         <p:spPr>
           <a:xfrm>
-            <a:off x="3835060" y="4645144"/>
+            <a:off x="3950799" y="4176224"/>
             <a:ext cx="215080" cy="112270"/>
           </a:xfrm>
           <a:custGeom>
@@ -6578,7 +6539,7 @@
         </p:nvSpPr>
         <p:spPr>
           <a:xfrm>
-            <a:off x="3719016" y="4690772"/>
+            <a:off x="3834755" y="4221852"/>
             <a:ext cx="122330" cy="62213"/>
           </a:xfrm>
           <a:custGeom>
@@ -6726,7 +6687,7 @@
         </p:nvSpPr>
         <p:spPr>
           <a:xfrm>
-            <a:off x="3670455" y="5500212"/>
+            <a:off x="3786194" y="5031292"/>
             <a:ext cx="69398" cy="171190"/>
           </a:xfrm>
           <a:custGeom>
@@ -6809,7 +6770,7 @@
         </p:nvSpPr>
         <p:spPr>
           <a:xfrm>
-            <a:off x="3605607" y="5424046"/>
+            <a:off x="3721346" y="4955126"/>
             <a:ext cx="1018" cy="1497"/>
           </a:xfrm>
           <a:custGeom>
@@ -6880,7 +6841,7 @@
         </p:nvSpPr>
         <p:spPr>
           <a:xfrm>
-            <a:off x="3606565" y="5425483"/>
+            <a:off x="3722304" y="4956563"/>
             <a:ext cx="1018" cy="1557"/>
           </a:xfrm>
           <a:custGeom>
@@ -6948,7 +6909,7 @@
         </p:nvSpPr>
         <p:spPr>
           <a:xfrm>
-            <a:off x="3607523" y="5426980"/>
+            <a:off x="3723262" y="4958060"/>
             <a:ext cx="1138" cy="1497"/>
           </a:xfrm>
           <a:custGeom>
@@ -7016,7 +6977,7 @@
         </p:nvSpPr>
         <p:spPr>
           <a:xfrm>
-            <a:off x="3608601" y="5428417"/>
+            <a:off x="3724340" y="4959497"/>
             <a:ext cx="1018" cy="1497"/>
           </a:xfrm>
           <a:custGeom>
@@ -7084,7 +7045,7 @@
         </p:nvSpPr>
         <p:spPr>
           <a:xfrm>
-            <a:off x="3609559" y="5429854"/>
+            <a:off x="3725298" y="4960934"/>
             <a:ext cx="1018" cy="1497"/>
           </a:xfrm>
           <a:custGeom>
@@ -7152,7 +7113,7 @@
         </p:nvSpPr>
         <p:spPr>
           <a:xfrm>
-            <a:off x="3610517" y="5431291"/>
+            <a:off x="3726256" y="4962371"/>
             <a:ext cx="1078" cy="1557"/>
           </a:xfrm>
           <a:custGeom>
@@ -7223,7 +7184,7 @@
         </p:nvSpPr>
         <p:spPr>
           <a:xfrm>
-            <a:off x="3611655" y="5432848"/>
+            <a:off x="3727394" y="4963928"/>
             <a:ext cx="1018" cy="1557"/>
           </a:xfrm>
           <a:custGeom>
@@ -7291,7 +7252,7 @@
         </p:nvSpPr>
         <p:spPr>
           <a:xfrm>
-            <a:off x="3612613" y="5434345"/>
+            <a:off x="3728352" y="4965425"/>
             <a:ext cx="1078" cy="1497"/>
           </a:xfrm>
           <a:custGeom>
@@ -7359,7 +7320,7 @@
         </p:nvSpPr>
         <p:spPr>
           <a:xfrm>
-            <a:off x="3613631" y="5435782"/>
+            <a:off x="3729370" y="4966862"/>
             <a:ext cx="1018" cy="1497"/>
           </a:xfrm>
           <a:custGeom>
@@ -7427,7 +7388,7 @@
         </p:nvSpPr>
         <p:spPr>
           <a:xfrm>
-            <a:off x="3614589" y="5437219"/>
+            <a:off x="3730328" y="4968299"/>
             <a:ext cx="1078" cy="1497"/>
           </a:xfrm>
           <a:custGeom>
@@ -7495,7 +7456,7 @@
         </p:nvSpPr>
         <p:spPr>
           <a:xfrm>
-            <a:off x="3615667" y="5438657"/>
+            <a:off x="3731406" y="4969737"/>
             <a:ext cx="1078" cy="1557"/>
           </a:xfrm>
           <a:custGeom>
@@ -7566,7 +7527,7 @@
         </p:nvSpPr>
         <p:spPr>
           <a:xfrm>
-            <a:off x="3616685" y="5440153"/>
+            <a:off x="3732424" y="4971233"/>
             <a:ext cx="1018" cy="1497"/>
           </a:xfrm>
           <a:custGeom>
@@ -7634,7 +7595,7 @@
         </p:nvSpPr>
         <p:spPr>
           <a:xfrm>
-            <a:off x="3617643" y="5441650"/>
+            <a:off x="3733382" y="4972730"/>
             <a:ext cx="1078" cy="1557"/>
           </a:xfrm>
           <a:custGeom>
@@ -7702,7 +7663,7 @@
         </p:nvSpPr>
         <p:spPr>
           <a:xfrm>
-            <a:off x="3618661" y="5443147"/>
+            <a:off x="3734400" y="4974227"/>
             <a:ext cx="1078" cy="1437"/>
           </a:xfrm>
           <a:custGeom>
@@ -7770,7 +7731,7 @@
         </p:nvSpPr>
         <p:spPr>
           <a:xfrm>
-            <a:off x="3619679" y="5444525"/>
+            <a:off x="3735418" y="4975605"/>
             <a:ext cx="1018" cy="1557"/>
           </a:xfrm>
           <a:custGeom>
@@ -7838,7 +7799,7 @@
         </p:nvSpPr>
         <p:spPr>
           <a:xfrm>
-            <a:off x="3620637" y="5446022"/>
+            <a:off x="3736376" y="4977102"/>
             <a:ext cx="1078" cy="1557"/>
           </a:xfrm>
           <a:custGeom>
@@ -7906,7 +7867,7 @@
         </p:nvSpPr>
         <p:spPr>
           <a:xfrm>
-            <a:off x="3621774" y="5447578"/>
+            <a:off x="3737513" y="4978658"/>
             <a:ext cx="1018" cy="1497"/>
           </a:xfrm>
           <a:custGeom>
@@ -7974,7 +7935,7 @@
         </p:nvSpPr>
         <p:spPr>
           <a:xfrm>
-            <a:off x="3622732" y="5449016"/>
+            <a:off x="3738471" y="4980096"/>
             <a:ext cx="1018" cy="1557"/>
           </a:xfrm>
           <a:custGeom>
@@ -8042,7 +8003,7 @@
         </p:nvSpPr>
         <p:spPr>
           <a:xfrm>
-            <a:off x="3623690" y="5450512"/>
+            <a:off x="3739429" y="4981592"/>
             <a:ext cx="1078" cy="1437"/>
           </a:xfrm>
           <a:custGeom>
@@ -8110,7 +8071,7 @@
         </p:nvSpPr>
         <p:spPr>
           <a:xfrm>
-            <a:off x="3624708" y="5451890"/>
+            <a:off x="3740447" y="4982970"/>
             <a:ext cx="1078" cy="1557"/>
           </a:xfrm>
           <a:custGeom>
@@ -8178,7 +8139,7 @@
         </p:nvSpPr>
         <p:spPr>
           <a:xfrm>
-            <a:off x="3625786" y="5453387"/>
+            <a:off x="3741525" y="4984467"/>
             <a:ext cx="1078" cy="1497"/>
           </a:xfrm>
           <a:custGeom>
@@ -8246,7 +8207,7 @@
         </p:nvSpPr>
         <p:spPr>
           <a:xfrm>
-            <a:off x="3626804" y="5454824"/>
+            <a:off x="3742543" y="4985904"/>
             <a:ext cx="1018" cy="1557"/>
           </a:xfrm>
           <a:custGeom>
@@ -8317,7 +8278,7 @@
         </p:nvSpPr>
         <p:spPr>
           <a:xfrm>
-            <a:off x="3627762" y="5456321"/>
+            <a:off x="3743501" y="4987401"/>
             <a:ext cx="1078" cy="1437"/>
           </a:xfrm>
           <a:custGeom>
@@ -8385,7 +8346,7 @@
         </p:nvSpPr>
         <p:spPr>
           <a:xfrm>
-            <a:off x="3628840" y="5457818"/>
+            <a:off x="3744579" y="4988898"/>
             <a:ext cx="1078" cy="1497"/>
           </a:xfrm>
           <a:custGeom>
@@ -8453,7 +8414,7 @@
         </p:nvSpPr>
         <p:spPr>
           <a:xfrm>
-            <a:off x="3629858" y="5459255"/>
+            <a:off x="3745597" y="4990335"/>
             <a:ext cx="1018" cy="1557"/>
           </a:xfrm>
           <a:custGeom>
@@ -8521,7 +8482,7 @@
         </p:nvSpPr>
         <p:spPr>
           <a:xfrm>
-            <a:off x="3630816" y="5460752"/>
+            <a:off x="3746555" y="4991832"/>
             <a:ext cx="1078" cy="1497"/>
           </a:xfrm>
           <a:custGeom>
@@ -8589,7 +8550,7 @@
         </p:nvSpPr>
         <p:spPr>
           <a:xfrm>
-            <a:off x="3631834" y="5462249"/>
+            <a:off x="3747573" y="4993329"/>
             <a:ext cx="1078" cy="1557"/>
           </a:xfrm>
           <a:custGeom>
@@ -8657,7 +8618,7 @@
         </p:nvSpPr>
         <p:spPr>
           <a:xfrm>
-            <a:off x="3632852" y="5463746"/>
+            <a:off x="3748591" y="4994826"/>
             <a:ext cx="1018" cy="1497"/>
           </a:xfrm>
           <a:custGeom>
@@ -8725,7 +8686,7 @@
         </p:nvSpPr>
         <p:spPr>
           <a:xfrm>
-            <a:off x="3633870" y="5465183"/>
+            <a:off x="3749609" y="4996263"/>
             <a:ext cx="1138" cy="1497"/>
           </a:xfrm>
           <a:custGeom>
@@ -8793,7 +8754,7 @@
         </p:nvSpPr>
         <p:spPr>
           <a:xfrm>
-            <a:off x="3634947" y="5466620"/>
+            <a:off x="3750686" y="4997700"/>
             <a:ext cx="1018" cy="1497"/>
           </a:xfrm>
           <a:custGeom>
@@ -8861,7 +8822,7 @@
         </p:nvSpPr>
         <p:spPr>
           <a:xfrm>
-            <a:off x="3635906" y="5468057"/>
+            <a:off x="3751645" y="4999137"/>
             <a:ext cx="1018" cy="1557"/>
           </a:xfrm>
           <a:custGeom>
@@ -8929,7 +8890,7 @@
         </p:nvSpPr>
         <p:spPr>
           <a:xfrm>
-            <a:off x="3636923" y="5469554"/>
+            <a:off x="3752662" y="5000634"/>
             <a:ext cx="1138" cy="1497"/>
           </a:xfrm>
           <a:custGeom>
@@ -8997,7 +8958,7 @@
         </p:nvSpPr>
         <p:spPr>
           <a:xfrm>
-            <a:off x="3474535" y="4975794"/>
+            <a:off x="3590274" y="4506874"/>
             <a:ext cx="1796" cy="2575"/>
           </a:xfrm>
           <a:custGeom>
@@ -9106,7 +9067,7 @@
         </p:nvSpPr>
         <p:spPr>
           <a:xfrm>
-            <a:off x="4489705" y="6028521"/>
+            <a:off x="4605444" y="5559601"/>
             <a:ext cx="2694" cy="6347"/>
           </a:xfrm>
           <a:custGeom>
@@ -9187,7 +9148,7 @@
         </p:nvSpPr>
         <p:spPr>
           <a:xfrm>
-            <a:off x="4270552" y="5042619"/>
+            <a:off x="4386291" y="4573699"/>
             <a:ext cx="1138" cy="1317"/>
           </a:xfrm>
           <a:custGeom>
@@ -9254,7 +9215,7 @@
         </p:nvSpPr>
         <p:spPr>
           <a:xfrm>
-            <a:off x="3121554" y="6733832"/>
+            <a:off x="3237293" y="6264912"/>
             <a:ext cx="1018" cy="778"/>
           </a:xfrm>
           <a:custGeom>
@@ -9327,7 +9288,7 @@
         </p:nvSpPr>
         <p:spPr>
           <a:xfrm>
-            <a:off x="3137601" y="4475209"/>
+            <a:off x="3253340" y="4006289"/>
             <a:ext cx="1072466" cy="934029"/>
           </a:xfrm>
           <a:custGeom>
@@ -9409,7 +9370,7 @@
         </p:nvSpPr>
         <p:spPr>
           <a:xfrm>
-            <a:off x="3359868" y="5916309"/>
+            <a:off x="3475607" y="5447389"/>
             <a:ext cx="1028157" cy="873732"/>
           </a:xfrm>
           <a:custGeom>
@@ -9486,7 +9447,7 @@
         </p:nvSpPr>
         <p:spPr>
           <a:xfrm>
-            <a:off x="2212308" y="5343629"/>
+            <a:off x="2328047" y="4874709"/>
             <a:ext cx="589554" cy="1001152"/>
           </a:xfrm>
           <a:custGeom>
@@ -9571,7 +9532,7 @@
         </p:nvSpPr>
         <p:spPr>
           <a:xfrm>
-            <a:off x="3385376" y="6082592"/>
+            <a:off x="3501115" y="5613672"/>
             <a:ext cx="771581" cy="1276888"/>
           </a:xfrm>
           <a:custGeom>
@@ -9638,7 +9599,7 @@
         </p:nvSpPr>
         <p:spPr>
           <a:xfrm>
-            <a:off x="4156903" y="6405936"/>
+            <a:off x="4272642" y="5937016"/>
             <a:ext cx="1135936" cy="630271"/>
           </a:xfrm>
           <a:custGeom>
@@ -9707,7 +9668,7 @@
         </p:nvSpPr>
         <p:spPr>
           <a:xfrm>
-            <a:off x="1578201" y="5222974"/>
+            <a:off x="1693940" y="4754054"/>
             <a:ext cx="1109410" cy="986362"/>
           </a:xfrm>
           <a:custGeom>
@@ -9777,7 +9738,7 @@
         </p:nvSpPr>
         <p:spPr>
           <a:xfrm>
-            <a:off x="1615564" y="5737212"/>
+            <a:off x="1731303" y="5268292"/>
             <a:ext cx="791161" cy="1298982"/>
           </a:xfrm>
           <a:custGeom>
@@ -9849,7 +9810,7 @@
         </p:nvSpPr>
         <p:spPr>
           <a:xfrm>
-            <a:off x="3020899" y="3751036"/>
+            <a:off x="3136638" y="3282116"/>
             <a:ext cx="1115638" cy="982171"/>
           </a:xfrm>
           <a:custGeom>
@@ -9927,7 +9888,7 @@
         </p:nvSpPr>
         <p:spPr>
           <a:xfrm>
-            <a:off x="3312146" y="4254017"/>
+            <a:off x="3427885" y="3785097"/>
             <a:ext cx="1104021" cy="987919"/>
           </a:xfrm>
           <a:custGeom>
@@ -10000,7 +9961,7 @@
         </p:nvSpPr>
         <p:spPr>
           <a:xfrm>
-            <a:off x="3591716" y="4733166"/>
+            <a:off x="3707455" y="4264246"/>
             <a:ext cx="60" cy="60"/>
           </a:xfrm>
           <a:custGeom>
@@ -10058,7 +10019,7 @@
         </p:nvSpPr>
         <p:spPr>
           <a:xfrm>
-            <a:off x="3591716" y="4696580"/>
+            <a:off x="3707455" y="4227660"/>
             <a:ext cx="63051" cy="36645"/>
           </a:xfrm>
           <a:custGeom>
@@ -10121,7 +10082,7 @@
         </p:nvSpPr>
         <p:spPr>
           <a:xfrm>
-            <a:off x="470783" y="7396887"/>
+            <a:off x="491133" y="6723537"/>
             <a:ext cx="6161484" cy="2455974"/>
           </a:xfrm>
           <a:prstGeom prst="rect">
@@ -10152,11 +10113,16 @@
             </a:lvl1pPr>
           </a:lstStyle>
           <a:p>
+            <a:pPr algn="ctr"/>
             <a:r>
-              <a:rPr lang="en-US" dirty="0"/>
+              <a:rPr lang="en-US" sz="4500" dirty="0">
+                <a:latin typeface="Abadi" panose="020B0604020104020204" pitchFamily="34" charset="0"/>
+              </a:rPr>
               <a:t>Help improve the world from your most daily activities</a:t>
             </a:r>
-            <a:endParaRPr lang="es-EC" dirty="0"/>
+            <a:endParaRPr lang="es-EC" sz="4500" dirty="0">
+              <a:latin typeface="Abadi" panose="020B0604020104020204" pitchFamily="34" charset="0"/>
+            </a:endParaRPr>
           </a:p>
         </p:txBody>
       </p:sp>
@@ -10182,7 +10148,7 @@
         </p:blipFill>
         <p:spPr>
           <a:xfrm>
-            <a:off x="544060" y="9649464"/>
+            <a:off x="1504706" y="9253894"/>
             <a:ext cx="4287101" cy="2455461"/>
           </a:xfrm>
           <a:prstGeom prst="rect">
@@ -10209,9 +10175,9 @@
     <p:bg>
       <p:bgPr>
         <a:solidFill>
-          <a:srgbClr val="00B0F0">
+          <a:schemeClr val="bg1">
             <a:alpha val="70000"/>
-          </a:srgbClr>
+          </a:schemeClr>
         </a:solidFill>
         <a:effectLst/>
       </p:bgPr>
@@ -10254,13 +10220,13 @@
           <a:lstStyle/>
           <a:p>
             <a:r>
-              <a:rPr lang="en-US" sz="4500" dirty="0">
-                <a:latin typeface="Amasis MT Pro Black" panose="02040A04050005020304" pitchFamily="18" charset="0"/>
+              <a:rPr lang="en-US" sz="4500" b="1" dirty="0">
+                <a:latin typeface="Abadi" panose="020B0604020104020204" pitchFamily="34" charset="0"/>
               </a:rPr>
               <a:t>Be different</a:t>
             </a:r>
-            <a:endParaRPr lang="es-EC" sz="4500" dirty="0">
-              <a:latin typeface="Amasis MT Pro Black" panose="02040A04050005020304" pitchFamily="18" charset="0"/>
+            <a:endParaRPr lang="es-EC" sz="4500" b="1" dirty="0">
+              <a:latin typeface="Abadi" panose="020B0604020104020204" pitchFamily="34" charset="0"/>
             </a:endParaRPr>
           </a:p>
         </p:txBody>
@@ -10297,41 +10263,41 @@
               <a:buNone/>
             </a:pPr>
             <a:r>
-              <a:rPr lang="en-US" sz="5500" b="0" i="0" dirty="0">
+              <a:rPr lang="en-US" sz="4500" b="0" i="0" dirty="0">
                 <a:solidFill>
                   <a:srgbClr val="000000"/>
                 </a:solidFill>
                 <a:effectLst/>
-                <a:latin typeface="+mj-lt"/>
+                <a:latin typeface="Abadi" panose="020B0604020104020204" pitchFamily="34" charset="0"/>
               </a:rPr>
               <a:t>Don’t Worry! </a:t>
             </a:r>
             <a:r>
-              <a:rPr lang="en-US" sz="5500" dirty="0">
+              <a:rPr lang="en-US" sz="4500" dirty="0">
                 <a:solidFill>
                   <a:srgbClr val="000000"/>
                 </a:solidFill>
-                <a:latin typeface="+mj-lt"/>
+                <a:latin typeface="Abadi" panose="020B0604020104020204" pitchFamily="34" charset="0"/>
               </a:rPr>
               <a:t>We will teach you about the </a:t>
             </a:r>
             <a:r>
-              <a:rPr lang="en-US" sz="5500" dirty="0" err="1">
+              <a:rPr lang="en-US" sz="4500" dirty="0" err="1">
                 <a:solidFill>
                   <a:srgbClr val="000000"/>
                 </a:solidFill>
-                <a:latin typeface="+mj-lt"/>
+                <a:latin typeface="Abadi" panose="020B0604020104020204" pitchFamily="34" charset="0"/>
               </a:rPr>
               <a:t>responsable</a:t>
             </a:r>
             <a:r>
-              <a:rPr lang="en-US" sz="5500" dirty="0">
+              <a:rPr lang="en-US" sz="4500" dirty="0">
                 <a:solidFill>
                   <a:srgbClr val="000000"/>
                 </a:solidFill>
-                <a:latin typeface="+mj-lt"/>
+                <a:latin typeface="Abadi" panose="020B0604020104020204" pitchFamily="34" charset="0"/>
               </a:rPr>
-              <a:t> products, so you will learn on each purchase</a:t>
+              <a:t> products, so you will learn on each purchase.</a:t>
             </a:r>
           </a:p>
           <a:p>
@@ -13516,16 +13482,6 @@
 <file path=ppt/slides/slide4.xml><?xml version="1.0" encoding="utf-8"?>
 <p:sld xmlns:a="http://schemas.openxmlformats.org/drawingml/2006/main" xmlns:r="http://schemas.openxmlformats.org/officeDocument/2006/relationships" xmlns:p="http://schemas.openxmlformats.org/presentationml/2006/main">
   <p:cSld>
-    <p:bg>
-      <p:bgPr>
-        <a:solidFill>
-          <a:srgbClr val="00B0F0">
-            <a:alpha val="70000"/>
-          </a:srgbClr>
-        </a:solidFill>
-        <a:effectLst/>
-      </p:bgPr>
-    </p:bg>
     <p:spTree>
       <p:nvGrpSpPr>
         <p:cNvPr id="1" name=""/>
@@ -13556,7 +13512,12 @@
             <p:ph type="title"/>
           </p:nvPr>
         </p:nvSpPr>
-        <p:spPr/>
+        <p:spPr>
+          <a:xfrm>
+            <a:off x="353284" y="-241202"/>
+            <a:ext cx="6161484" cy="2455974"/>
+          </a:xfrm>
+        </p:spPr>
         <p:txBody>
           <a:bodyPr>
             <a:normAutofit/>
@@ -13564,13 +13525,13 @@
           <a:lstStyle/>
           <a:p>
             <a:r>
-              <a:rPr lang="en-US" sz="4500" dirty="0">
-                <a:latin typeface="Amasis MT Pro Black" panose="02040A04050005020304" pitchFamily="18" charset="0"/>
+              <a:rPr lang="en-US" sz="4500" b="1" dirty="0">
+                <a:latin typeface="Abadi" panose="020B0604020104020204" pitchFamily="34" charset="0"/>
               </a:rPr>
               <a:t>Coins</a:t>
             </a:r>
-            <a:endParaRPr lang="es-EC" sz="4500" dirty="0">
-              <a:latin typeface="Amasis MT Pro Black" panose="02040A04050005020304" pitchFamily="18" charset="0"/>
+            <a:endParaRPr lang="es-EC" sz="4500" b="1" dirty="0">
+              <a:latin typeface="Abadi" panose="020B0604020104020204" pitchFamily="34" charset="0"/>
             </a:endParaRPr>
           </a:p>
         </p:txBody>
@@ -13593,13 +13554,13 @@
         </p:nvSpPr>
         <p:spPr>
           <a:xfrm>
-            <a:off x="529164" y="2322144"/>
-            <a:ext cx="6161484" cy="8062062"/>
+            <a:off x="353284" y="2214772"/>
+            <a:ext cx="6690648" cy="8062062"/>
           </a:xfrm>
         </p:spPr>
         <p:txBody>
           <a:bodyPr>
-            <a:normAutofit/>
+            <a:noAutofit/>
           </a:bodyPr>
           <a:lstStyle/>
           <a:p>
@@ -13607,37 +13568,42 @@
               <a:buNone/>
             </a:pPr>
             <a:r>
-              <a:rPr lang="en-US" sz="3440" dirty="0">
-                <a:latin typeface="Calibri Light (Títulos)"/>
+              <a:rPr lang="en-US" sz="4500" dirty="0">
+                <a:latin typeface="Abadi" panose="020B0604020104020204" pitchFamily="34" charset="0"/>
               </a:rPr>
               <a:t>We will give you </a:t>
             </a:r>
+          </a:p>
+          <a:p>
+            <a:pPr marL="0" indent="0">
+              <a:buNone/>
+            </a:pPr>
             <a:r>
-              <a:rPr lang="en-US" sz="3440" dirty="0" err="1">
-                <a:latin typeface="Calibri Light (Títulos)"/>
+              <a:rPr lang="en-US" sz="4500" dirty="0" err="1">
+                <a:latin typeface="Abadi" panose="020B0604020104020204" pitchFamily="34" charset="0"/>
               </a:rPr>
               <a:t>Eko</a:t>
             </a:r>
             <a:r>
-              <a:rPr lang="en-US" sz="3440" dirty="0">
-                <a:latin typeface="Calibri Light (Títulos)"/>
+              <a:rPr lang="en-US" sz="4500" dirty="0">
+                <a:latin typeface="Abadi" panose="020B0604020104020204" pitchFamily="34" charset="0"/>
               </a:rPr>
-              <a:t>-Coins, these will be credited to your account immediately after making your </a:t>
+              <a:t>-Coins after making your </a:t>
             </a:r>
             <a:r>
-              <a:rPr lang="en-US" sz="3440" dirty="0" err="1">
-                <a:latin typeface="Calibri Light (Títulos)"/>
+              <a:rPr lang="en-US" sz="4500" dirty="0" err="1">
+                <a:latin typeface="Abadi" panose="020B0604020104020204" pitchFamily="34" charset="0"/>
               </a:rPr>
               <a:t>responsable</a:t>
             </a:r>
             <a:r>
-              <a:rPr lang="en-US" sz="3440" dirty="0">
-                <a:latin typeface="Calibri Light (Títulos)"/>
+              <a:rPr lang="en-US" sz="4500" dirty="0">
+                <a:latin typeface="Abadi" panose="020B0604020104020204" pitchFamily="34" charset="0"/>
               </a:rPr>
-              <a:t> purchase. You can share them with your friends, and they serve as a currency to buy anything within our App </a:t>
+              <a:t> purchase. Share them with your friends. </a:t>
             </a:r>
-            <a:endParaRPr lang="es-EC" sz="3440" dirty="0">
-              <a:latin typeface="Calibri Light (Títulos)"/>
+            <a:endParaRPr lang="es-EC" sz="4500" dirty="0">
+              <a:latin typeface="Abadi" panose="020B0604020104020204" pitchFamily="34" charset="0"/>
             </a:endParaRPr>
           </a:p>
         </p:txBody>
@@ -13670,8 +13636,8 @@
         </p:blipFill>
         <p:spPr>
           <a:xfrm>
-            <a:off x="491133" y="5610448"/>
-            <a:ext cx="5886450" cy="5886450"/>
+            <a:off x="1361738" y="5613898"/>
+            <a:ext cx="4144575" cy="4439717"/>
           </a:xfrm>
           <a:prstGeom prst="rect">
             <a:avLst/>
@@ -13692,11 +13658,16 @@
         </p:nvGrpSpPr>
         <p:grpSpPr>
           <a:xfrm>
-            <a:off x="2555323" y="7483381"/>
-            <a:ext cx="1758069" cy="2140584"/>
+            <a:off x="2815108" y="7026514"/>
+            <a:ext cx="1237834" cy="1614485"/>
             <a:chOff x="4154118" y="3868888"/>
             <a:chExt cx="736411" cy="536939"/>
           </a:xfrm>
+          <a:effectLst>
+            <a:outerShdw sx="1000" sy="1000" algn="ctr" rotWithShape="0">
+              <a:srgbClr val="000000"/>
+            </a:outerShdw>
+          </a:effectLst>
         </p:grpSpPr>
         <p:sp>
           <p:nvSpPr>
@@ -13811,7 +13782,9 @@
               </a:pathLst>
             </a:custGeom>
             <a:solidFill>
-              <a:srgbClr val="00B050"/>
+              <a:srgbClr val="00B050">
+                <a:alpha val="55000"/>
+              </a:srgbClr>
             </a:solidFill>
             <a:ln>
               <a:noFill/>
@@ -13949,11 +13922,20 @@
               </a:pathLst>
             </a:custGeom>
             <a:solidFill>
-              <a:srgbClr val="00B050"/>
+              <a:srgbClr val="00B050">
+                <a:alpha val="55000"/>
+              </a:srgbClr>
             </a:solidFill>
             <a:ln>
               <a:noFill/>
             </a:ln>
+            <a:effectLst>
+              <a:outerShdw sx="1000" sy="1000" algn="ctr" rotWithShape="0">
+                <a:srgbClr val="000000">
+                  <a:alpha val="0"/>
+                </a:srgbClr>
+              </a:outerShdw>
+            </a:effectLst>
           </p:spPr>
           <p:txBody>
             <a:bodyPr spcFirstLastPara="1" wrap="square" lIns="91425" tIns="91425" rIns="91425" bIns="91425" anchor="ctr" anchorCtr="0">
@@ -14047,7 +14029,9 @@
               </a:pathLst>
             </a:custGeom>
             <a:solidFill>
-              <a:srgbClr val="00B050"/>
+              <a:srgbClr val="00B050">
+                <a:alpha val="55000"/>
+              </a:srgbClr>
             </a:solidFill>
             <a:ln>
               <a:noFill/>
@@ -14073,6 +14057,47 @@
           </p:txBody>
         </p:sp>
       </p:grpSp>
+      <p:sp>
+        <p:nvSpPr>
+          <p:cNvPr id="10" name="CuadroTexto 9">
+            <a:extLst>
+              <a:ext uri="{FF2B5EF4-FFF2-40B4-BE49-F238E27FC236}">
+                <a16:creationId xmlns:a16="http://schemas.microsoft.com/office/drawing/2014/main" id="{E2D5C075-A417-40F9-8E0A-5424F736365B}"/>
+              </a:ext>
+            </a:extLst>
+          </p:cNvPr>
+          <p:cNvSpPr txBox="1"/>
+          <p:nvPr/>
+        </p:nvSpPr>
+        <p:spPr>
+          <a:xfrm>
+            <a:off x="615851" y="10640160"/>
+            <a:ext cx="6085422" cy="1477328"/>
+          </a:xfrm>
+          <a:prstGeom prst="rect">
+            <a:avLst/>
+          </a:prstGeom>
+          <a:noFill/>
+        </p:spPr>
+        <p:txBody>
+          <a:bodyPr wrap="square" rtlCol="0">
+            <a:spAutoFit/>
+          </a:bodyPr>
+          <a:lstStyle/>
+          <a:p>
+            <a:pPr algn="ctr"/>
+            <a:r>
+              <a:rPr lang="en-US" sz="4500" dirty="0">
+                <a:latin typeface="Abadi" panose="020B0604020104020204" pitchFamily="34" charset="0"/>
+              </a:rPr>
+              <a:t>A currency to buy anything within our App</a:t>
+            </a:r>
+            <a:endParaRPr lang="es-EC" sz="4500" dirty="0">
+              <a:latin typeface="Abadi" panose="020B0604020104020204" pitchFamily="34" charset="0"/>
+            </a:endParaRPr>
+          </a:p>
+        </p:txBody>
+      </p:sp>
     </p:spTree>
     <p:extLst>
       <p:ext uri="{BB962C8B-B14F-4D97-AF65-F5344CB8AC3E}">
@@ -14092,9 +14117,9 @@
     <p:bg>
       <p:bgPr>
         <a:solidFill>
-          <a:srgbClr val="00B0F0">
+          <a:schemeClr val="bg1">
             <a:alpha val="70000"/>
-          </a:srgbClr>
+          </a:schemeClr>
         </a:solidFill>
         <a:effectLst/>
       </p:bgPr>
@@ -14129,7 +14154,12 @@
             <p:ph type="title"/>
           </p:nvPr>
         </p:nvSpPr>
-        <p:spPr/>
+        <p:spPr>
+          <a:xfrm>
+            <a:off x="462936" y="0"/>
+            <a:ext cx="6161484" cy="2455974"/>
+          </a:xfrm>
+        </p:spPr>
         <p:txBody>
           <a:bodyPr>
             <a:normAutofit/>
@@ -14137,20 +14167,20 @@
           <a:lstStyle/>
           <a:p>
             <a:r>
-              <a:rPr lang="es-EC" sz="4500" dirty="0">
-                <a:latin typeface="Amasis MT Pro Black" panose="02040A04050005020304" pitchFamily="18" charset="0"/>
+              <a:rPr lang="es-EC" sz="4500" b="1" dirty="0">
+                <a:latin typeface="Abadi" panose="020B0604020104020204" pitchFamily="34" charset="0"/>
               </a:rPr>
               <a:t>A </a:t>
             </a:r>
             <a:r>
-              <a:rPr lang="es-EC" sz="4500" dirty="0" err="1">
-                <a:latin typeface="Amasis MT Pro Black" panose="02040A04050005020304" pitchFamily="18" charset="0"/>
+              <a:rPr lang="es-EC" sz="4500" b="1" dirty="0" err="1">
+                <a:latin typeface="Abadi" panose="020B0604020104020204" pitchFamily="34" charset="0"/>
               </a:rPr>
               <a:t>Fact</a:t>
             </a:r>
             <a:r>
-              <a:rPr lang="es-EC" sz="4500" dirty="0">
-                <a:latin typeface="Amasis MT Pro Black" panose="02040A04050005020304" pitchFamily="18" charset="0"/>
+              <a:rPr lang="es-EC" sz="4500" b="1" dirty="0">
+                <a:latin typeface="Abadi" panose="020B0604020104020204" pitchFamily="34" charset="0"/>
               </a:rPr>
               <a:t>!</a:t>
             </a:r>
@@ -14175,7 +14205,7 @@
         </p:nvSpPr>
         <p:spPr>
           <a:xfrm>
-            <a:off x="491133" y="2322144"/>
+            <a:off x="519330" y="1636208"/>
             <a:ext cx="6161484" cy="8062062"/>
           </a:xfrm>
         </p:spPr>
@@ -14189,13 +14219,13 @@
               <a:buNone/>
             </a:pPr>
             <a:r>
-              <a:rPr lang="en-US" sz="3440" dirty="0">
-                <a:latin typeface="Calibri Light (Títulos)"/>
+              <a:rPr lang="en-US" sz="4500" dirty="0">
+                <a:latin typeface="Abadi" panose="020B0604020104020204" pitchFamily="34" charset="0"/>
               </a:rPr>
               <a:t>For each user who uses the app, our team will plant a tree. In this way you will have made a change from the first moment you download our App.</a:t>
             </a:r>
-            <a:endParaRPr lang="es-EC" sz="3440" dirty="0">
-              <a:latin typeface="Calibri Light (Títulos)"/>
+            <a:endParaRPr lang="es-EC" sz="4500" dirty="0">
+              <a:latin typeface="Abadi" panose="020B0604020104020204" pitchFamily="34" charset="0"/>
             </a:endParaRPr>
           </a:p>
         </p:txBody>
@@ -14214,8 +14244,8 @@
         </p:nvSpPr>
         <p:spPr>
           <a:xfrm>
-            <a:off x="569397" y="6212642"/>
-            <a:ext cx="3447228" cy="3773126"/>
+            <a:off x="677095" y="7465906"/>
+            <a:ext cx="3035725" cy="3173661"/>
           </a:xfrm>
           <a:custGeom>
             <a:avLst/>
@@ -14292,8 +14322,8 @@
         </p:nvSpPr>
         <p:spPr>
           <a:xfrm>
-            <a:off x="708502" y="4818952"/>
-            <a:ext cx="2918565" cy="3044526"/>
+            <a:off x="799595" y="6293642"/>
+            <a:ext cx="2570170" cy="2560820"/>
           </a:xfrm>
           <a:custGeom>
             <a:avLst/>
@@ -14380,8 +14410,8 @@
         </p:nvSpPr>
         <p:spPr>
           <a:xfrm>
-            <a:off x="2167785" y="8849954"/>
-            <a:ext cx="347951" cy="2271628"/>
+            <a:off x="2084680" y="9684208"/>
+            <a:ext cx="306415" cy="1910718"/>
           </a:xfrm>
           <a:custGeom>
             <a:avLst/>
@@ -14425,7 +14455,9 @@
             </a:pathLst>
           </a:custGeom>
           <a:solidFill>
-            <a:schemeClr val="accent6"/>
+            <a:schemeClr val="accent4">
+              <a:lumMod val="75000"/>
+            </a:schemeClr>
           </a:solidFill>
           <a:ln>
             <a:noFill/>
@@ -14464,8 +14496,8 @@
         </p:nvSpPr>
         <p:spPr>
           <a:xfrm>
-            <a:off x="3696522" y="6084069"/>
-            <a:ext cx="3447228" cy="3773126"/>
+            <a:off x="3430929" y="7357760"/>
+            <a:ext cx="3035725" cy="3173661"/>
           </a:xfrm>
           <a:custGeom>
             <a:avLst/>
@@ -14542,8 +14574,8 @@
         </p:nvSpPr>
         <p:spPr>
           <a:xfrm>
-            <a:off x="3979618" y="4625297"/>
-            <a:ext cx="2918565" cy="3044526"/>
+            <a:off x="3680231" y="6130754"/>
+            <a:ext cx="2570170" cy="2560820"/>
           </a:xfrm>
           <a:custGeom>
             <a:avLst/>
@@ -14630,8 +14662,8 @@
         </p:nvSpPr>
         <p:spPr>
           <a:xfrm>
-            <a:off x="5294910" y="8721381"/>
-            <a:ext cx="347951" cy="2271628"/>
+            <a:off x="4838514" y="9576063"/>
+            <a:ext cx="306415" cy="1910718"/>
           </a:xfrm>
           <a:custGeom>
             <a:avLst/>
@@ -14675,7 +14707,9 @@
             </a:pathLst>
           </a:custGeom>
           <a:solidFill>
-            <a:schemeClr val="accent6"/>
+            <a:schemeClr val="accent4">
+              <a:lumMod val="75000"/>
+            </a:schemeClr>
           </a:solidFill>
           <a:ln>
             <a:noFill/>
@@ -14719,9 +14753,9 @@
     <p:bg>
       <p:bgPr>
         <a:solidFill>
-          <a:srgbClr val="00B0F0">
+          <a:schemeClr val="bg1">
             <a:alpha val="70000"/>
-          </a:srgbClr>
+          </a:schemeClr>
         </a:solidFill>
         <a:effectLst/>
       </p:bgPr>
@@ -14769,25 +14803,25 @@
           <a:lstStyle/>
           <a:p>
             <a:r>
-              <a:rPr lang="es-EC" sz="4500" dirty="0" err="1">
-                <a:latin typeface="Amasis MT Pro Black" panose="02040A04050005020304" pitchFamily="18" charset="0"/>
+              <a:rPr lang="es-EC" sz="4500" b="1" dirty="0" err="1">
+                <a:latin typeface="Abadi" panose="020B0604020104020204" pitchFamily="34" charset="0"/>
               </a:rPr>
               <a:t>Being</a:t>
             </a:r>
             <a:r>
-              <a:rPr lang="es-EC" sz="4500" dirty="0">
-                <a:latin typeface="Amasis MT Pro Black" panose="02040A04050005020304" pitchFamily="18" charset="0"/>
+              <a:rPr lang="es-EC" sz="4500" b="1" dirty="0">
+                <a:latin typeface="Abadi" panose="020B0604020104020204" pitchFamily="34" charset="0"/>
               </a:rPr>
               <a:t> </a:t>
             </a:r>
             <a:r>
-              <a:rPr lang="es-EC" sz="4500" dirty="0" err="1">
-                <a:latin typeface="Amasis MT Pro Black" panose="02040A04050005020304" pitchFamily="18" charset="0"/>
+              <a:rPr lang="es-EC" sz="4500" b="1" dirty="0" err="1">
+                <a:latin typeface="Abadi" panose="020B0604020104020204" pitchFamily="34" charset="0"/>
               </a:rPr>
               <a:t>Aware</a:t>
             </a:r>
-            <a:endParaRPr lang="es-EC" sz="4500" dirty="0">
-              <a:latin typeface="Amasis MT Pro Black" panose="02040A04050005020304" pitchFamily="18" charset="0"/>
+            <a:endParaRPr lang="es-EC" sz="4500" b="1" dirty="0">
+              <a:latin typeface="Abadi" panose="020B0604020104020204" pitchFamily="34" charset="0"/>
             </a:endParaRPr>
           </a:p>
         </p:txBody>
@@ -14810,7 +14844,7 @@
         </p:nvSpPr>
         <p:spPr>
           <a:xfrm>
-            <a:off x="491133" y="2266397"/>
+            <a:off x="488480" y="2571051"/>
             <a:ext cx="6161484" cy="8062062"/>
           </a:xfrm>
         </p:spPr>
@@ -14824,10 +14858,10 @@
               <a:buNone/>
             </a:pPr>
             <a:r>
-              <a:rPr lang="en-US" sz="3440" dirty="0">
-                <a:latin typeface="Calibri Light (Títulos)"/>
+              <a:rPr lang="en-US" sz="4500" dirty="0">
+                <a:latin typeface="Abadi" panose="020B0604020104020204" pitchFamily="34" charset="0"/>
               </a:rPr>
-              <a:t>Being aware of what happens on our planet makes you special. We want more people like you to join in generating green consumption and responsible production from the most daily and simple activities such as go to the market.</a:t>
+              <a:t>Being aware of what happens on our planet makes you special. We want more people like you to join in generating green consumption.</a:t>
             </a:r>
           </a:p>
         </p:txBody>
@@ -14846,7 +14880,7 @@
         </p:nvGrpSpPr>
         <p:grpSpPr>
           <a:xfrm>
-            <a:off x="1114845" y="6845871"/>
+            <a:off x="867710" y="7528540"/>
             <a:ext cx="2155928" cy="2357448"/>
             <a:chOff x="7402844" y="1669886"/>
             <a:chExt cx="965892" cy="1288876"/>
@@ -16546,7 +16580,7 @@
         </p:nvGrpSpPr>
         <p:grpSpPr>
           <a:xfrm>
-            <a:off x="1074134" y="6762641"/>
+            <a:off x="826999" y="7445310"/>
             <a:ext cx="2246845" cy="2427394"/>
             <a:chOff x="7362133" y="1586655"/>
             <a:chExt cx="1047341" cy="1336959"/>
@@ -17041,7 +17075,7 @@
         </p:nvGrpSpPr>
         <p:grpSpPr>
           <a:xfrm>
-            <a:off x="4267490" y="5670506"/>
+            <a:off x="4020355" y="6353175"/>
             <a:ext cx="1974678" cy="2481164"/>
             <a:chOff x="5062951" y="1557809"/>
             <a:chExt cx="1227298" cy="1401216"/>
@@ -19145,7 +19179,7 @@
         </p:nvGrpSpPr>
         <p:grpSpPr>
           <a:xfrm>
-            <a:off x="4453098" y="7501802"/>
+            <a:off x="4205963" y="8184471"/>
             <a:ext cx="1554085" cy="640394"/>
             <a:chOff x="5194969" y="2597368"/>
             <a:chExt cx="965892" cy="361657"/>
@@ -19411,7 +19445,7 @@
         </p:nvGrpSpPr>
         <p:grpSpPr>
           <a:xfrm>
-            <a:off x="4383085" y="8610640"/>
+            <a:off x="4135950" y="9293309"/>
             <a:ext cx="1530374" cy="1829312"/>
             <a:chOff x="802951" y="1669886"/>
             <a:chExt cx="873541" cy="1072545"/>
@@ -20502,7 +20536,7 @@
         </p:nvGrpSpPr>
         <p:grpSpPr>
           <a:xfrm>
-            <a:off x="4315926" y="10177008"/>
+            <a:off x="4068791" y="10859677"/>
             <a:ext cx="1692166" cy="630113"/>
             <a:chOff x="756798" y="2589582"/>
             <a:chExt cx="965892" cy="369442"/>
@@ -20722,7 +20756,7 @@
         </p:nvGrpSpPr>
         <p:grpSpPr>
           <a:xfrm>
-            <a:off x="4459088" y="8450674"/>
+            <a:off x="4187353" y="9083321"/>
             <a:ext cx="1474525" cy="1060283"/>
             <a:chOff x="854985" y="1509920"/>
             <a:chExt cx="841662" cy="621655"/>

</xml_diff>